<commit_message>
fbd and rubrics document
</commit_message>
<xml_diff>
--- a/FBD.pptx
+++ b/FBD.pptx
@@ -655,7 +655,7 @@
           <a:p>
             <a:fld id="{1870F0E8-0843-4BFD-9E14-8611BA0237C2}" type="datetimeFigureOut">
               <a:rPr lang="en-US" smtClean="0"/>
-              <a:t>21-Feb-20</a:t>
+              <a:t>2/22/2020</a:t>
             </a:fld>
             <a:endParaRPr lang="en-US"/>
           </a:p>
@@ -825,7 +825,7 @@
           <a:p>
             <a:fld id="{1870F0E8-0843-4BFD-9E14-8611BA0237C2}" type="datetimeFigureOut">
               <a:rPr lang="en-US" smtClean="0"/>
-              <a:t>21-Feb-20</a:t>
+              <a:t>2/22/2020</a:t>
             </a:fld>
             <a:endParaRPr lang="en-US"/>
           </a:p>
@@ -1005,7 +1005,7 @@
           <a:p>
             <a:fld id="{1870F0E8-0843-4BFD-9E14-8611BA0237C2}" type="datetimeFigureOut">
               <a:rPr lang="en-US" smtClean="0"/>
-              <a:t>21-Feb-20</a:t>
+              <a:t>2/22/2020</a:t>
             </a:fld>
             <a:endParaRPr lang="en-US"/>
           </a:p>
@@ -1175,7 +1175,7 @@
           <a:p>
             <a:fld id="{1870F0E8-0843-4BFD-9E14-8611BA0237C2}" type="datetimeFigureOut">
               <a:rPr lang="en-US" smtClean="0"/>
-              <a:t>21-Feb-20</a:t>
+              <a:t>2/22/2020</a:t>
             </a:fld>
             <a:endParaRPr lang="en-US"/>
           </a:p>
@@ -1419,7 +1419,7 @@
           <a:p>
             <a:fld id="{1870F0E8-0843-4BFD-9E14-8611BA0237C2}" type="datetimeFigureOut">
               <a:rPr lang="en-US" smtClean="0"/>
-              <a:t>21-Feb-20</a:t>
+              <a:t>2/22/2020</a:t>
             </a:fld>
             <a:endParaRPr lang="en-US"/>
           </a:p>
@@ -1651,7 +1651,7 @@
           <a:p>
             <a:fld id="{1870F0E8-0843-4BFD-9E14-8611BA0237C2}" type="datetimeFigureOut">
               <a:rPr lang="en-US" smtClean="0"/>
-              <a:t>21-Feb-20</a:t>
+              <a:t>2/22/2020</a:t>
             </a:fld>
             <a:endParaRPr lang="en-US"/>
           </a:p>
@@ -2018,7 +2018,7 @@
           <a:p>
             <a:fld id="{1870F0E8-0843-4BFD-9E14-8611BA0237C2}" type="datetimeFigureOut">
               <a:rPr lang="en-US" smtClean="0"/>
-              <a:t>21-Feb-20</a:t>
+              <a:t>2/22/2020</a:t>
             </a:fld>
             <a:endParaRPr lang="en-US"/>
           </a:p>
@@ -2136,7 +2136,7 @@
           <a:p>
             <a:fld id="{1870F0E8-0843-4BFD-9E14-8611BA0237C2}" type="datetimeFigureOut">
               <a:rPr lang="en-US" smtClean="0"/>
-              <a:t>21-Feb-20</a:t>
+              <a:t>2/22/2020</a:t>
             </a:fld>
             <a:endParaRPr lang="en-US"/>
           </a:p>
@@ -2231,7 +2231,7 @@
           <a:p>
             <a:fld id="{1870F0E8-0843-4BFD-9E14-8611BA0237C2}" type="datetimeFigureOut">
               <a:rPr lang="en-US" smtClean="0"/>
-              <a:t>21-Feb-20</a:t>
+              <a:t>2/22/2020</a:t>
             </a:fld>
             <a:endParaRPr lang="en-US"/>
           </a:p>
@@ -2508,7 +2508,7 @@
           <a:p>
             <a:fld id="{1870F0E8-0843-4BFD-9E14-8611BA0237C2}" type="datetimeFigureOut">
               <a:rPr lang="en-US" smtClean="0"/>
-              <a:t>21-Feb-20</a:t>
+              <a:t>2/22/2020</a:t>
             </a:fld>
             <a:endParaRPr lang="en-US"/>
           </a:p>
@@ -2765,7 +2765,7 @@
           <a:p>
             <a:fld id="{1870F0E8-0843-4BFD-9E14-8611BA0237C2}" type="datetimeFigureOut">
               <a:rPr lang="en-US" smtClean="0"/>
-              <a:t>21-Feb-20</a:t>
+              <a:t>2/22/2020</a:t>
             </a:fld>
             <a:endParaRPr lang="en-US"/>
           </a:p>
@@ -2978,7 +2978,7 @@
           <a:p>
             <a:fld id="{1870F0E8-0843-4BFD-9E14-8611BA0237C2}" type="datetimeFigureOut">
               <a:rPr lang="en-US" smtClean="0"/>
-              <a:t>21-Feb-20</a:t>
+              <a:t>2/22/2020</a:t>
             </a:fld>
             <a:endParaRPr lang="en-US"/>
           </a:p>

</xml_diff>